<commit_message>
ISIS-1320: moved ContentMappingService to applib, updated docs.
</commit_message>
<xml_diff>
--- a/content/guides/images/reference-services/categories.pptx
+++ b/content/guides/images/reference-services/categories.pptx
@@ -288,7 +288,7 @@
           <a:p>
             <a:fld id="{EA92691D-FF03-40D7-9ED0-9214EECCD472}" type="datetimeFigureOut">
               <a:rPr lang="en-GB" smtClean="0"/>
-              <a:t>13/03/2016</a:t>
+              <a:t>14/03/2016</a:t>
             </a:fld>
             <a:endParaRPr lang="en-GB"/>
           </a:p>
@@ -458,7 +458,7 @@
           <a:p>
             <a:fld id="{EA92691D-FF03-40D7-9ED0-9214EECCD472}" type="datetimeFigureOut">
               <a:rPr lang="en-GB" smtClean="0"/>
-              <a:t>13/03/2016</a:t>
+              <a:t>14/03/2016</a:t>
             </a:fld>
             <a:endParaRPr lang="en-GB"/>
           </a:p>
@@ -638,7 +638,7 @@
           <a:p>
             <a:fld id="{EA92691D-FF03-40D7-9ED0-9214EECCD472}" type="datetimeFigureOut">
               <a:rPr lang="en-GB" smtClean="0"/>
-              <a:t>13/03/2016</a:t>
+              <a:t>14/03/2016</a:t>
             </a:fld>
             <a:endParaRPr lang="en-GB"/>
           </a:p>
@@ -808,7 +808,7 @@
           <a:p>
             <a:fld id="{EA92691D-FF03-40D7-9ED0-9214EECCD472}" type="datetimeFigureOut">
               <a:rPr lang="en-GB" smtClean="0"/>
-              <a:t>13/03/2016</a:t>
+              <a:t>14/03/2016</a:t>
             </a:fld>
             <a:endParaRPr lang="en-GB"/>
           </a:p>
@@ -1054,7 +1054,7 @@
           <a:p>
             <a:fld id="{EA92691D-FF03-40D7-9ED0-9214EECCD472}" type="datetimeFigureOut">
               <a:rPr lang="en-GB" smtClean="0"/>
-              <a:t>13/03/2016</a:t>
+              <a:t>14/03/2016</a:t>
             </a:fld>
             <a:endParaRPr lang="en-GB"/>
           </a:p>
@@ -1342,7 +1342,7 @@
           <a:p>
             <a:fld id="{EA92691D-FF03-40D7-9ED0-9214EECCD472}" type="datetimeFigureOut">
               <a:rPr lang="en-GB" smtClean="0"/>
-              <a:t>13/03/2016</a:t>
+              <a:t>14/03/2016</a:t>
             </a:fld>
             <a:endParaRPr lang="en-GB"/>
           </a:p>
@@ -1764,7 +1764,7 @@
           <a:p>
             <a:fld id="{EA92691D-FF03-40D7-9ED0-9214EECCD472}" type="datetimeFigureOut">
               <a:rPr lang="en-GB" smtClean="0"/>
-              <a:t>13/03/2016</a:t>
+              <a:t>14/03/2016</a:t>
             </a:fld>
             <a:endParaRPr lang="en-GB"/>
           </a:p>
@@ -1882,7 +1882,7 @@
           <a:p>
             <a:fld id="{EA92691D-FF03-40D7-9ED0-9214EECCD472}" type="datetimeFigureOut">
               <a:rPr lang="en-GB" smtClean="0"/>
-              <a:t>13/03/2016</a:t>
+              <a:t>14/03/2016</a:t>
             </a:fld>
             <a:endParaRPr lang="en-GB"/>
           </a:p>
@@ -1977,7 +1977,7 @@
           <a:p>
             <a:fld id="{EA92691D-FF03-40D7-9ED0-9214EECCD472}" type="datetimeFigureOut">
               <a:rPr lang="en-GB" smtClean="0"/>
-              <a:t>13/03/2016</a:t>
+              <a:t>14/03/2016</a:t>
             </a:fld>
             <a:endParaRPr lang="en-GB"/>
           </a:p>
@@ -2254,7 +2254,7 @@
           <a:p>
             <a:fld id="{EA92691D-FF03-40D7-9ED0-9214EECCD472}" type="datetimeFigureOut">
               <a:rPr lang="en-GB" smtClean="0"/>
-              <a:t>13/03/2016</a:t>
+              <a:t>14/03/2016</a:t>
             </a:fld>
             <a:endParaRPr lang="en-GB"/>
           </a:p>
@@ -2507,7 +2507,7 @@
           <a:p>
             <a:fld id="{EA92691D-FF03-40D7-9ED0-9214EECCD472}" type="datetimeFigureOut">
               <a:rPr lang="en-GB" smtClean="0"/>
-              <a:t>13/03/2016</a:t>
+              <a:t>14/03/2016</a:t>
             </a:fld>
             <a:endParaRPr lang="en-GB"/>
           </a:p>
@@ -2720,7 +2720,7 @@
           <a:p>
             <a:fld id="{EA92691D-FF03-40D7-9ED0-9214EECCD472}" type="datetimeFigureOut">
               <a:rPr lang="en-GB" smtClean="0"/>
-              <a:t>13/03/2016</a:t>
+              <a:t>14/03/2016</a:t>
             </a:fld>
             <a:endParaRPr lang="en-GB"/>
           </a:p>
@@ -3103,8 +3103,8 @@
         </p:nvSpPr>
         <p:spPr>
           <a:xfrm>
-            <a:off x="323528" y="3789040"/>
-            <a:ext cx="8568952" cy="2376264"/>
+            <a:off x="723322" y="3501008"/>
+            <a:ext cx="6873014" cy="2376264"/>
           </a:xfrm>
           <a:prstGeom prst="rect">
             <a:avLst/>
@@ -3154,8 +3154,8 @@
         </p:nvSpPr>
         <p:spPr>
           <a:xfrm>
-            <a:off x="1979712" y="692696"/>
-            <a:ext cx="6912768" cy="2952328"/>
+            <a:off x="2379506" y="404664"/>
+            <a:ext cx="5216830" cy="2952328"/>
           </a:xfrm>
           <a:prstGeom prst="rect">
             <a:avLst/>
@@ -3205,7 +3205,7 @@
         </p:nvSpPr>
         <p:spPr>
           <a:xfrm>
-            <a:off x="539552" y="3933056"/>
+            <a:off x="939346" y="3645024"/>
             <a:ext cx="1512168" cy="1078865"/>
           </a:xfrm>
           <a:prstGeom prst="rect">
@@ -3263,7 +3263,7 @@
         </p:nvSpPr>
         <p:spPr>
           <a:xfrm>
-            <a:off x="2195736" y="2350135"/>
+            <a:off x="2595530" y="2062103"/>
             <a:ext cx="1512168" cy="1078865"/>
           </a:xfrm>
           <a:prstGeom prst="rect">
@@ -3322,7 +3322,7 @@
         </p:nvSpPr>
         <p:spPr>
           <a:xfrm>
-            <a:off x="3851920" y="2348880"/>
+            <a:off x="4251714" y="2060848"/>
             <a:ext cx="1512168" cy="1078865"/>
           </a:xfrm>
           <a:prstGeom prst="rect">
@@ -3354,7 +3354,6 @@
               <a:rPr lang="en-GB" dirty="0" smtClean="0"/>
               <a:t>Core/Domain</a:t>
             </a:r>
-            <a:endParaRPr lang="en-GB" dirty="0" smtClean="0"/>
           </a:p>
           <a:p>
             <a:pPr algn="ctr"/>
@@ -3374,7 +3373,7 @@
         </p:nvSpPr>
         <p:spPr>
           <a:xfrm>
-            <a:off x="7164288" y="2348880"/>
+            <a:off x="5907898" y="2060848"/>
             <a:ext cx="1512168" cy="1078865"/>
           </a:xfrm>
           <a:prstGeom prst="rect">
@@ -3432,7 +3431,7 @@
         </p:nvSpPr>
         <p:spPr>
           <a:xfrm>
-            <a:off x="2987824" y="1125505"/>
+            <a:off x="2598582" y="837473"/>
             <a:ext cx="1512168" cy="1080120"/>
           </a:xfrm>
           <a:prstGeom prst="rect">
@@ -3483,7 +3482,7 @@
         </p:nvSpPr>
         <p:spPr>
           <a:xfrm>
-            <a:off x="7164288" y="3933056"/>
+            <a:off x="5907898" y="3645024"/>
             <a:ext cx="1512168" cy="1078865"/>
           </a:xfrm>
           <a:prstGeom prst="rect">
@@ -3534,8 +3533,8 @@
         </p:nvSpPr>
         <p:spPr>
           <a:xfrm>
-            <a:off x="5508104" y="2348880"/>
-            <a:ext cx="1512168" cy="1078865"/>
+            <a:off x="5907898" y="838729"/>
+            <a:ext cx="1512168" cy="646056"/>
           </a:xfrm>
           <a:prstGeom prst="rect">
             <a:avLst/>
@@ -3545,8 +3544,8 @@
           <a:lnRef idx="1">
             <a:schemeClr val="dk1"/>
           </a:lnRef>
-          <a:fillRef idx="1001">
-            <a:schemeClr val="dk2"/>
+          <a:fillRef idx="2">
+            <a:schemeClr val="dk1"/>
           </a:fillRef>
           <a:effectRef idx="1">
             <a:schemeClr val="dk1"/>
@@ -3561,33 +3560,10 @@
           <a:p>
             <a:pPr algn="ctr"/>
             <a:r>
-              <a:rPr lang="en-GB" dirty="0" smtClean="0">
-                <a:solidFill>
-                  <a:schemeClr val="bg1"/>
-                </a:solidFill>
-              </a:rPr>
+              <a:rPr lang="en-GB" dirty="0"/>
               <a:t>Testing</a:t>
             </a:r>
-            <a:br>
-              <a:rPr lang="en-GB" dirty="0" smtClean="0">
-                <a:solidFill>
-                  <a:schemeClr val="bg1"/>
-                </a:solidFill>
-              </a:rPr>
-            </a:br>
-            <a:r>
-              <a:rPr lang="en-GB" dirty="0" smtClean="0">
-                <a:solidFill>
-                  <a:schemeClr val="bg1"/>
-                </a:solidFill>
-              </a:rPr>
-              <a:t>API</a:t>
-            </a:r>
-            <a:endParaRPr lang="en-GB" dirty="0">
-              <a:solidFill>
-                <a:schemeClr val="bg1"/>
-              </a:solidFill>
-            </a:endParaRPr>
+            <a:endParaRPr lang="en-GB" dirty="0"/>
           </a:p>
         </p:txBody>
       </p:sp>
@@ -3599,7 +3575,7 @@
         </p:nvSpPr>
         <p:spPr>
           <a:xfrm>
-            <a:off x="4644008" y="1125505"/>
+            <a:off x="4254766" y="837473"/>
             <a:ext cx="1512168" cy="1080120"/>
           </a:xfrm>
           <a:prstGeom prst="rect">
@@ -3644,78 +3620,13 @@
       </p:sp>
       <p:sp>
         <p:nvSpPr>
-          <p:cNvPr id="15" name="Rectangle 14"/>
-          <p:cNvSpPr/>
-          <p:nvPr/>
-        </p:nvSpPr>
-        <p:spPr>
-          <a:xfrm>
-            <a:off x="5508104" y="3933056"/>
-            <a:ext cx="1512168" cy="1078865"/>
-          </a:xfrm>
-          <a:prstGeom prst="rect">
-            <a:avLst/>
-          </a:prstGeom>
-        </p:spPr>
-        <p:style>
-          <a:lnRef idx="1">
-            <a:schemeClr val="dk1"/>
-          </a:lnRef>
-          <a:fillRef idx="1001">
-            <a:schemeClr val="dk2"/>
-          </a:fillRef>
-          <a:effectRef idx="1">
-            <a:schemeClr val="dk1"/>
-          </a:effectRef>
-          <a:fontRef idx="minor">
-            <a:schemeClr val="dk1"/>
-          </a:fontRef>
-        </p:style>
-        <p:txBody>
-          <a:bodyPr rtlCol="0" anchor="ctr"/>
-          <a:lstStyle/>
-          <a:p>
-            <a:pPr algn="ctr"/>
-            <a:r>
-              <a:rPr lang="en-GB" dirty="0" smtClean="0">
-                <a:solidFill>
-                  <a:schemeClr val="bg1"/>
-                </a:solidFill>
-              </a:rPr>
-              <a:t>Testing</a:t>
-            </a:r>
-            <a:br>
-              <a:rPr lang="en-GB" dirty="0" smtClean="0">
-                <a:solidFill>
-                  <a:schemeClr val="bg1"/>
-                </a:solidFill>
-              </a:rPr>
-            </a:br>
-            <a:r>
-              <a:rPr lang="en-GB" dirty="0" smtClean="0">
-                <a:solidFill>
-                  <a:schemeClr val="bg1"/>
-                </a:solidFill>
-              </a:rPr>
-              <a:t>SPI</a:t>
-            </a:r>
-            <a:endParaRPr lang="en-GB" dirty="0">
-              <a:solidFill>
-                <a:schemeClr val="bg1"/>
-              </a:solidFill>
-            </a:endParaRPr>
-          </a:p>
-        </p:txBody>
-      </p:sp>
-      <p:sp>
-        <p:nvSpPr>
           <p:cNvPr id="16" name="Rectangle 15"/>
           <p:cNvSpPr/>
           <p:nvPr/>
         </p:nvSpPr>
         <p:spPr>
           <a:xfrm>
-            <a:off x="2195736" y="3933056"/>
+            <a:off x="2595530" y="3645024"/>
             <a:ext cx="1512168" cy="1078865"/>
           </a:xfrm>
           <a:prstGeom prst="rect">
@@ -3759,11 +3670,7 @@
             <a:pPr algn="ctr"/>
             <a:r>
               <a:rPr lang="en-GB" dirty="0" smtClean="0"/>
-              <a:t>S</a:t>
-            </a:r>
-            <a:r>
-              <a:rPr lang="en-GB" dirty="0" smtClean="0"/>
-              <a:t>PI</a:t>
+              <a:t>SPI</a:t>
             </a:r>
             <a:endParaRPr lang="en-GB" dirty="0"/>
           </a:p>
@@ -3777,8 +3684,8 @@
         </p:nvSpPr>
         <p:spPr>
           <a:xfrm>
-            <a:off x="539552" y="5158448"/>
-            <a:ext cx="8136904" cy="539432"/>
+            <a:off x="939346" y="4870416"/>
+            <a:ext cx="6480720" cy="502800"/>
           </a:xfrm>
           <a:prstGeom prst="rect">
             <a:avLst/>

</xml_diff>